<commit_message>
update on presentation and documentation
</commit_message>
<xml_diff>
--- a/Додаток для замовлення продуктів в магазині.pptx
+++ b/Додаток для замовлення продуктів в магазині.pptx
@@ -6,14 +6,15 @@
   </p:sldMasterIdLst>
   <p:sldIdLst>
     <p:sldId id="256" r:id="rId2"/>
-    <p:sldId id="257" r:id="rId3"/>
-    <p:sldId id="258" r:id="rId4"/>
-    <p:sldId id="259" r:id="rId5"/>
-    <p:sldId id="260" r:id="rId6"/>
-    <p:sldId id="261" r:id="rId7"/>
-    <p:sldId id="264" r:id="rId8"/>
+    <p:sldId id="265" r:id="rId3"/>
+    <p:sldId id="257" r:id="rId4"/>
+    <p:sldId id="258" r:id="rId5"/>
+    <p:sldId id="259" r:id="rId6"/>
+    <p:sldId id="260" r:id="rId7"/>
+    <p:sldId id="261" r:id="rId8"/>
     <p:sldId id="262" r:id="rId9"/>
-    <p:sldId id="263" r:id="rId10"/>
+    <p:sldId id="264" r:id="rId10"/>
+    <p:sldId id="263" r:id="rId11"/>
   </p:sldIdLst>
   <p:sldSz cx="12192000" cy="6858000"/>
   <p:notesSz cx="6858000" cy="9144000"/>
@@ -112,6 +113,11 @@
       </a:defRPr>
     </a:lvl9pPr>
   </p:defaultTextStyle>
+  <p:extLst>
+    <p:ext uri="{EFAFB233-063F-42B5-8137-9DF3F51BA10A}">
+      <p15:sldGuideLst xmlns:p15="http://schemas.microsoft.com/office/powerpoint/2012/main"/>
+    </p:ext>
+  </p:extLst>
 </p:presentation>
 </file>
 
@@ -4513,7 +4519,7 @@
           <a:p>
             <a:r>
               <a:rPr lang="uk-UA" dirty="0"/>
-              <a:t>Додаток для замовлення продуктів в магазині</a:t>
+              <a:t>Застосунок для замовлення продуктів в магазині</a:t>
             </a:r>
           </a:p>
         </p:txBody>
@@ -4558,6 +4564,159 @@
     <p:extLst>
       <p:ext uri="{BB962C8B-B14F-4D97-AF65-F5344CB8AC3E}">
         <p14:creationId xmlns:p14="http://schemas.microsoft.com/office/powerpoint/2010/main" val="993442966"/>
+      </p:ext>
+    </p:extLst>
+  </p:cSld>
+  <p:clrMapOvr>
+    <a:masterClrMapping/>
+  </p:clrMapOvr>
+</p:sld>
+</file>
+
+<file path=ppt/slides/slide10.xml><?xml version="1.0" encoding="utf-8"?>
+<p:sld xmlns:a="http://schemas.openxmlformats.org/drawingml/2006/main" xmlns:r="http://schemas.openxmlformats.org/officeDocument/2006/relationships" xmlns:p="http://schemas.openxmlformats.org/presentationml/2006/main">
+  <p:cSld>
+    <p:spTree>
+      <p:nvGrpSpPr>
+        <p:cNvPr id="1" name=""/>
+        <p:cNvGrpSpPr/>
+        <p:nvPr/>
+      </p:nvGrpSpPr>
+      <p:grpSpPr>
+        <a:xfrm>
+          <a:off x="0" y="0"/>
+          <a:ext cx="0" cy="0"/>
+          <a:chOff x="0" y="0"/>
+          <a:chExt cx="0" cy="0"/>
+        </a:xfrm>
+      </p:grpSpPr>
+      <p:sp>
+        <p:nvSpPr>
+          <p:cNvPr id="2" name="Заголовок 1">
+            <a:extLst>
+              <a:ext uri="{FF2B5EF4-FFF2-40B4-BE49-F238E27FC236}">
+                <a16:creationId xmlns:a16="http://schemas.microsoft.com/office/drawing/2014/main" id="{F95F038A-8C1A-056F-B6C4-1C3215E054E7}"/>
+              </a:ext>
+            </a:extLst>
+          </p:cNvPr>
+          <p:cNvSpPr>
+            <a:spLocks noGrp="1"/>
+          </p:cNvSpPr>
+          <p:nvPr>
+            <p:ph type="title"/>
+          </p:nvPr>
+        </p:nvSpPr>
+        <p:spPr/>
+        <p:txBody>
+          <a:bodyPr/>
+          <a:lstStyle/>
+          <a:p>
+            <a:r>
+              <a:rPr lang="uk-UA" dirty="0"/>
+              <a:t>Сторінка оформлення замовлення</a:t>
+            </a:r>
+          </a:p>
+        </p:txBody>
+      </p:sp>
+      <p:sp>
+        <p:nvSpPr>
+          <p:cNvPr id="4" name="Місце для тексту 3">
+            <a:extLst>
+              <a:ext uri="{FF2B5EF4-FFF2-40B4-BE49-F238E27FC236}">
+                <a16:creationId xmlns:a16="http://schemas.microsoft.com/office/drawing/2014/main" id="{66EA8E42-E104-1E78-E905-318D5F328030}"/>
+              </a:ext>
+            </a:extLst>
+          </p:cNvPr>
+          <p:cNvSpPr>
+            <a:spLocks noGrp="1"/>
+          </p:cNvSpPr>
+          <p:nvPr>
+            <p:ph type="body" sz="half" idx="2"/>
+          </p:nvPr>
+        </p:nvSpPr>
+        <p:spPr/>
+        <p:txBody>
+          <a:bodyPr/>
+          <a:lstStyle/>
+          <a:p>
+            <a:r>
+              <a:rPr lang="uk-UA" dirty="0"/>
+              <a:t>Тут можна вибрати спосіб оплати та доставки товару. Оплата можлива готівкою або карткою. Доставка можлива до дверей або </a:t>
+            </a:r>
+            <a:r>
+              <a:rPr lang="uk-UA" dirty="0" err="1"/>
+              <a:t>самовивіз</a:t>
+            </a:r>
+            <a:r>
+              <a:rPr lang="uk-UA" dirty="0"/>
+              <a:t> з відділення доставки.</a:t>
+            </a:r>
+          </a:p>
+        </p:txBody>
+      </p:sp>
+      <p:pic>
+        <p:nvPicPr>
+          <p:cNvPr id="12" name="Місце для вмісту 11">
+            <a:extLst>
+              <a:ext uri="{FF2B5EF4-FFF2-40B4-BE49-F238E27FC236}">
+                <a16:creationId xmlns:a16="http://schemas.microsoft.com/office/drawing/2014/main" id="{35F2FE58-ECFC-F5AF-1AE5-8520766A2232}"/>
+              </a:ext>
+            </a:extLst>
+          </p:cNvPr>
+          <p:cNvPicPr>
+            <a:picLocks noGrp="1" noChangeAspect="1"/>
+          </p:cNvPicPr>
+          <p:nvPr>
+            <p:ph idx="1"/>
+          </p:nvPr>
+        </p:nvPicPr>
+        <p:blipFill>
+          <a:blip r:embed="rId2"/>
+          <a:stretch>
+            <a:fillRect/>
+          </a:stretch>
+        </p:blipFill>
+        <p:spPr>
+          <a:xfrm>
+            <a:off x="5108318" y="669425"/>
+            <a:ext cx="5446712" cy="2516267"/>
+          </a:xfrm>
+        </p:spPr>
+      </p:pic>
+      <p:pic>
+        <p:nvPicPr>
+          <p:cNvPr id="14" name="Рисунок 13">
+            <a:extLst>
+              <a:ext uri="{FF2B5EF4-FFF2-40B4-BE49-F238E27FC236}">
+                <a16:creationId xmlns:a16="http://schemas.microsoft.com/office/drawing/2014/main" id="{4F66181F-AB08-301F-10B8-28DE7F4213FC}"/>
+              </a:ext>
+            </a:extLst>
+          </p:cNvPr>
+          <p:cNvPicPr>
+            <a:picLocks noChangeAspect="1"/>
+          </p:cNvPicPr>
+          <p:nvPr/>
+        </p:nvPicPr>
+        <p:blipFill>
+          <a:blip r:embed="rId3"/>
+          <a:stretch>
+            <a:fillRect/>
+          </a:stretch>
+        </p:blipFill>
+        <p:spPr>
+          <a:xfrm>
+            <a:off x="4636036" y="3961507"/>
+            <a:ext cx="6629399" cy="1865490"/>
+          </a:xfrm>
+          <a:prstGeom prst="rect">
+            <a:avLst/>
+          </a:prstGeom>
+        </p:spPr>
+      </p:pic>
+    </p:spTree>
+    <p:extLst>
+      <p:ext uri="{BB962C8B-B14F-4D97-AF65-F5344CB8AC3E}">
+        <p14:creationId xmlns:p14="http://schemas.microsoft.com/office/powerpoint/2010/main" val="3135643495"/>
       </p:ext>
     </p:extLst>
   </p:cSld>
@@ -4589,7 +4748,7 @@
           <p:cNvPr id="2" name="Заголовок 1">
             <a:extLst>
               <a:ext uri="{FF2B5EF4-FFF2-40B4-BE49-F238E27FC236}">
-                <a16:creationId xmlns:a16="http://schemas.microsoft.com/office/drawing/2014/main" id="{2428B89C-5368-514F-19B4-C13C79428A02}"/>
+                <a16:creationId xmlns:a16="http://schemas.microsoft.com/office/drawing/2014/main" id="{C0478F81-4958-7284-EB4A-DCC3D46582E7}"/>
               </a:ext>
             </a:extLst>
           </p:cNvPr>
@@ -4607,44 +4766,107 @@
           <a:p>
             <a:r>
               <a:rPr lang="uk-UA" dirty="0"/>
-              <a:t>Діаграма класів додатку</a:t>
-            </a:r>
-          </a:p>
-        </p:txBody>
-      </p:sp>
-      <p:pic>
-        <p:nvPicPr>
-          <p:cNvPr id="5" name="Місце для вмісту 4">
+              <a:t>Загальна інформація</a:t>
+            </a:r>
+          </a:p>
+        </p:txBody>
+      </p:sp>
+      <p:sp>
+        <p:nvSpPr>
+          <p:cNvPr id="3" name="Місце для вмісту 2">
             <a:extLst>
               <a:ext uri="{FF2B5EF4-FFF2-40B4-BE49-F238E27FC236}">
-                <a16:creationId xmlns:a16="http://schemas.microsoft.com/office/drawing/2014/main" id="{873BE3DE-0AE8-542C-37FF-CA2C3BD8B52D}"/>
+                <a16:creationId xmlns:a16="http://schemas.microsoft.com/office/drawing/2014/main" id="{1D2A52D4-4059-311E-4598-3D930D5FF164}"/>
               </a:ext>
             </a:extLst>
           </p:cNvPr>
-          <p:cNvPicPr>
-            <a:picLocks noGrp="1" noChangeAspect="1"/>
-          </p:cNvPicPr>
+          <p:cNvSpPr>
+            <a:spLocks noGrp="1"/>
+          </p:cNvSpPr>
           <p:nvPr>
             <p:ph idx="1"/>
           </p:nvPr>
-        </p:nvPicPr>
-        <p:blipFill>
-          <a:blip r:embed="rId2"/>
-          <a:stretch>
-            <a:fillRect/>
-          </a:stretch>
-        </p:blipFill>
-        <p:spPr>
-          <a:xfrm>
-            <a:off x="4039472" y="1885285"/>
-            <a:ext cx="4921648" cy="4440078"/>
-          </a:xfrm>
-        </p:spPr>
-      </p:pic>
+        </p:nvSpPr>
+        <p:spPr/>
+        <p:txBody>
+          <a:bodyPr/>
+          <a:lstStyle/>
+          <a:p>
+            <a:pPr marL="0" indent="0">
+              <a:buNone/>
+            </a:pPr>
+            <a:r>
+              <a:rPr lang="uk-UA" dirty="0"/>
+              <a:t>Додаток призначений для замовлення продуктів у магазині з можливістю вибрати тип доставки</a:t>
+            </a:r>
+            <a:endParaRPr lang="en-US" dirty="0"/>
+          </a:p>
+          <a:p>
+            <a:r>
+              <a:rPr lang="uk-UA" dirty="0"/>
+              <a:t>Фреймворк: </a:t>
+            </a:r>
+            <a:r>
+              <a:rPr lang="en-US" dirty="0"/>
+              <a:t>Flutter</a:t>
+            </a:r>
+          </a:p>
+          <a:p>
+            <a:r>
+              <a:rPr lang="uk-UA" dirty="0"/>
+              <a:t>Мова програмування: </a:t>
+            </a:r>
+            <a:r>
+              <a:rPr lang="en-US" dirty="0"/>
+              <a:t>Dart</a:t>
+            </a:r>
+          </a:p>
+          <a:p>
+            <a:r>
+              <a:rPr lang="uk-UA" dirty="0"/>
+              <a:t>Платформи: </a:t>
+            </a:r>
+            <a:r>
+              <a:rPr lang="en-US" dirty="0"/>
+              <a:t>Web, Android</a:t>
+            </a:r>
+          </a:p>
+          <a:p>
+            <a:r>
+              <a:rPr lang="uk-UA" dirty="0"/>
+              <a:t>База даних:</a:t>
+            </a:r>
+            <a:r>
+              <a:rPr lang="ru-RU" dirty="0"/>
+              <a:t> </a:t>
+            </a:r>
+            <a:r>
+              <a:rPr lang="en-US" dirty="0"/>
+              <a:t>Cloud </a:t>
+            </a:r>
+            <a:r>
+              <a:rPr lang="en-US" dirty="0" err="1"/>
+              <a:t>Firestore</a:t>
+            </a:r>
+            <a:endParaRPr lang="en-US" dirty="0"/>
+          </a:p>
+          <a:p>
+            <a:r>
+              <a:rPr lang="uk-UA" dirty="0"/>
+              <a:t>Система аутентифікації:  </a:t>
+            </a:r>
+            <a:r>
+              <a:rPr lang="en-US" dirty="0"/>
+              <a:t>Firebase Authentication</a:t>
+            </a:r>
+            <a:endParaRPr lang="uk-UA" dirty="0"/>
+          </a:p>
+        </p:txBody>
+      </p:sp>
     </p:spTree>
     <p:extLst>
       <p:ext uri="{BB962C8B-B14F-4D97-AF65-F5344CB8AC3E}">
-        <p14:creationId xmlns:p14="http://schemas.microsoft.com/office/powerpoint/2010/main" val="370877349"/>
+        <p14:creationId xmlns:p14="http://schemas.microsoft.com/office/powerpoint/2010/main" val="1947286033"/>
       </p:ext>
     </p:extLst>
   </p:cSld>
@@ -4676,7 +4898,7 @@
           <p:cNvPr id="2" name="Заголовок 1">
             <a:extLst>
               <a:ext uri="{FF2B5EF4-FFF2-40B4-BE49-F238E27FC236}">
-                <a16:creationId xmlns:a16="http://schemas.microsoft.com/office/drawing/2014/main" id="{D434CA09-44C8-38BC-E182-F10A0D3CF39D}"/>
+                <a16:creationId xmlns:a16="http://schemas.microsoft.com/office/drawing/2014/main" id="{2428B89C-5368-514F-19B4-C13C79428A02}"/>
               </a:ext>
             </a:extLst>
           </p:cNvPr>
@@ -4694,7 +4916,7 @@
           <a:p>
             <a:r>
               <a:rPr lang="uk-UA" dirty="0"/>
-              <a:t>Блок-схема роботи додатку</a:t>
+              <a:t>Діаграма класів застосунку</a:t>
             </a:r>
           </a:p>
         </p:txBody>
@@ -4704,7 +4926,7 @@
           <p:cNvPr id="5" name="Місце для вмісту 4">
             <a:extLst>
               <a:ext uri="{FF2B5EF4-FFF2-40B4-BE49-F238E27FC236}">
-                <a16:creationId xmlns:a16="http://schemas.microsoft.com/office/drawing/2014/main" id="{B7A1EE1C-8D17-246D-F1DE-053B9DB7A497}"/>
+                <a16:creationId xmlns:a16="http://schemas.microsoft.com/office/drawing/2014/main" id="{873BE3DE-0AE8-542C-37FF-CA2C3BD8B52D}"/>
               </a:ext>
             </a:extLst>
           </p:cNvPr>
@@ -4723,15 +4945,15 @@
         </p:blipFill>
         <p:spPr>
           <a:xfrm>
-            <a:off x="3332480" y="1473883"/>
-            <a:ext cx="6146800" cy="5277121"/>
+            <a:off x="4039472" y="1885285"/>
+            <a:ext cx="4921648" cy="4440078"/>
           </a:xfrm>
         </p:spPr>
       </p:pic>
     </p:spTree>
     <p:extLst>
       <p:ext uri="{BB962C8B-B14F-4D97-AF65-F5344CB8AC3E}">
-        <p14:creationId xmlns:p14="http://schemas.microsoft.com/office/powerpoint/2010/main" val="2519596256"/>
+        <p14:creationId xmlns:p14="http://schemas.microsoft.com/office/powerpoint/2010/main" val="370877349"/>
       </p:ext>
     </p:extLst>
   </p:cSld>
@@ -4763,7 +4985,7 @@
           <p:cNvPr id="2" name="Заголовок 1">
             <a:extLst>
               <a:ext uri="{FF2B5EF4-FFF2-40B4-BE49-F238E27FC236}">
-                <a16:creationId xmlns:a16="http://schemas.microsoft.com/office/drawing/2014/main" id="{E8F745DC-CA03-DF84-E91C-55FD6EF4834C}"/>
+                <a16:creationId xmlns:a16="http://schemas.microsoft.com/office/drawing/2014/main" id="{D434CA09-44C8-38BC-E182-F10A0D3CF39D}"/>
               </a:ext>
             </a:extLst>
           </p:cNvPr>
@@ -4781,17 +5003,17 @@
           <a:p>
             <a:r>
               <a:rPr lang="uk-UA" dirty="0"/>
-              <a:t>Початкова сторінка</a:t>
+              <a:t>Блок-схема роботи застосунку</a:t>
             </a:r>
           </a:p>
         </p:txBody>
       </p:sp>
       <p:pic>
         <p:nvPicPr>
-          <p:cNvPr id="6" name="Місце для вмісту 5">
+          <p:cNvPr id="5" name="Місце для вмісту 4">
             <a:extLst>
               <a:ext uri="{FF2B5EF4-FFF2-40B4-BE49-F238E27FC236}">
-                <a16:creationId xmlns:a16="http://schemas.microsoft.com/office/drawing/2014/main" id="{CF427EEF-3333-0259-AB71-2B532F466A70}"/>
+                <a16:creationId xmlns:a16="http://schemas.microsoft.com/office/drawing/2014/main" id="{B7A1EE1C-8D17-246D-F1DE-053B9DB7A497}"/>
               </a:ext>
             </a:extLst>
           </p:cNvPr>
@@ -4810,43 +5032,15 @@
         </p:blipFill>
         <p:spPr>
           <a:xfrm>
-            <a:off x="5119688" y="2165818"/>
-            <a:ext cx="5446712" cy="2524777"/>
+            <a:off x="3332480" y="1473883"/>
+            <a:ext cx="6146800" cy="5277121"/>
           </a:xfrm>
         </p:spPr>
       </p:pic>
-      <p:sp>
-        <p:nvSpPr>
-          <p:cNvPr id="4" name="Місце для тексту 3">
-            <a:extLst>
-              <a:ext uri="{FF2B5EF4-FFF2-40B4-BE49-F238E27FC236}">
-                <a16:creationId xmlns:a16="http://schemas.microsoft.com/office/drawing/2014/main" id="{6FDAD18A-CE0F-F5BC-3748-F27872996E3C}"/>
-              </a:ext>
-            </a:extLst>
-          </p:cNvPr>
-          <p:cNvSpPr>
-            <a:spLocks noGrp="1"/>
-          </p:cNvSpPr>
-          <p:nvPr>
-            <p:ph type="body" sz="half" idx="2"/>
-          </p:nvPr>
-        </p:nvSpPr>
-        <p:spPr/>
-        <p:txBody>
-          <a:bodyPr/>
-          <a:lstStyle/>
-          <a:p>
-            <a:r>
-              <a:rPr lang="uk-UA" dirty="0"/>
-              <a:t>Тут користувач може ввести дані для входу в систему. Якщо він не зареєстрований, він може створити обліковий запис.</a:t>
-            </a:r>
-          </a:p>
-        </p:txBody>
-      </p:sp>
     </p:spTree>
     <p:extLst>
       <p:ext uri="{BB962C8B-B14F-4D97-AF65-F5344CB8AC3E}">
-        <p14:creationId xmlns:p14="http://schemas.microsoft.com/office/powerpoint/2010/main" val="3654277022"/>
+        <p14:creationId xmlns:p14="http://schemas.microsoft.com/office/powerpoint/2010/main" val="2519596256"/>
       </p:ext>
     </p:extLst>
   </p:cSld>
@@ -4878,7 +5072,7 @@
           <p:cNvPr id="2" name="Заголовок 1">
             <a:extLst>
               <a:ext uri="{FF2B5EF4-FFF2-40B4-BE49-F238E27FC236}">
-                <a16:creationId xmlns:a16="http://schemas.microsoft.com/office/drawing/2014/main" id="{C5C1ABFB-30A8-9747-8643-B402AB99EC65}"/>
+                <a16:creationId xmlns:a16="http://schemas.microsoft.com/office/drawing/2014/main" id="{E8F745DC-CA03-DF84-E91C-55FD6EF4834C}"/>
               </a:ext>
             </a:extLst>
           </p:cNvPr>
@@ -4896,7 +5090,7 @@
           <a:p>
             <a:r>
               <a:rPr lang="uk-UA" dirty="0"/>
-              <a:t>Сторінка реєстрації</a:t>
+              <a:t>Початкова сторінка</a:t>
             </a:r>
           </a:p>
         </p:txBody>
@@ -4906,7 +5100,7 @@
           <p:cNvPr id="6" name="Місце для вмісту 5">
             <a:extLst>
               <a:ext uri="{FF2B5EF4-FFF2-40B4-BE49-F238E27FC236}">
-                <a16:creationId xmlns:a16="http://schemas.microsoft.com/office/drawing/2014/main" id="{00541D27-563C-2FD2-5AD8-6C2050477E7B}"/>
+                <a16:creationId xmlns:a16="http://schemas.microsoft.com/office/drawing/2014/main" id="{CF427EEF-3333-0259-AB71-2B532F466A70}"/>
               </a:ext>
             </a:extLst>
           </p:cNvPr>
@@ -4925,8 +5119,8 @@
         </p:blipFill>
         <p:spPr>
           <a:xfrm>
-            <a:off x="5119688" y="1971676"/>
-            <a:ext cx="5883290" cy="2711828"/>
+            <a:off x="5119688" y="2165818"/>
+            <a:ext cx="5446712" cy="2524777"/>
           </a:xfrm>
         </p:spPr>
       </p:pic>
@@ -4935,7 +5129,7 @@
           <p:cNvPr id="4" name="Місце для тексту 3">
             <a:extLst>
               <a:ext uri="{FF2B5EF4-FFF2-40B4-BE49-F238E27FC236}">
-                <a16:creationId xmlns:a16="http://schemas.microsoft.com/office/drawing/2014/main" id="{41EDE77A-1171-5139-C970-E3962C0545DA}"/>
+                <a16:creationId xmlns:a16="http://schemas.microsoft.com/office/drawing/2014/main" id="{6FDAD18A-CE0F-F5BC-3748-F27872996E3C}"/>
               </a:ext>
             </a:extLst>
           </p:cNvPr>
@@ -4953,39 +5147,7 @@
           <a:p>
             <a:r>
               <a:rPr lang="uk-UA" dirty="0"/>
-              <a:t>Тут користувач створює свій обліковий запис. Дані зберігаються у </a:t>
-            </a:r>
-            <a:r>
-              <a:rPr lang="en-US" dirty="0"/>
-              <a:t>Firebase</a:t>
-            </a:r>
-            <a:r>
-              <a:rPr lang="uk-UA" dirty="0"/>
-              <a:t> з використанням технологій </a:t>
-            </a:r>
-            <a:r>
-              <a:rPr lang="en-US" dirty="0"/>
-              <a:t>Firebase Authentication </a:t>
-            </a:r>
-            <a:r>
-              <a:rPr lang="uk-UA" dirty="0"/>
-              <a:t>та </a:t>
-            </a:r>
-            <a:r>
-              <a:rPr lang="en-US" dirty="0"/>
-              <a:t>Cloud </a:t>
-            </a:r>
-            <a:r>
-              <a:rPr lang="en-US" dirty="0" err="1"/>
-              <a:t>Firestore</a:t>
-            </a:r>
-            <a:r>
-              <a:rPr lang="en-US" dirty="0"/>
-              <a:t>.</a:t>
-            </a:r>
-            <a:r>
-              <a:rPr lang="uk-UA" dirty="0"/>
-              <a:t> </a:t>
+              <a:t>Тут користувач може ввести дані для входу в систему. Якщо він не зареєстрований, він може створити обліковий запис.</a:t>
             </a:r>
           </a:p>
         </p:txBody>
@@ -4993,7 +5155,7 @@
     </p:spTree>
     <p:extLst>
       <p:ext uri="{BB962C8B-B14F-4D97-AF65-F5344CB8AC3E}">
-        <p14:creationId xmlns:p14="http://schemas.microsoft.com/office/powerpoint/2010/main" val="2906563175"/>
+        <p14:creationId xmlns:p14="http://schemas.microsoft.com/office/powerpoint/2010/main" val="3654277022"/>
       </p:ext>
     </p:extLst>
   </p:cSld>
@@ -5025,7 +5187,7 @@
           <p:cNvPr id="2" name="Заголовок 1">
             <a:extLst>
               <a:ext uri="{FF2B5EF4-FFF2-40B4-BE49-F238E27FC236}">
-                <a16:creationId xmlns:a16="http://schemas.microsoft.com/office/drawing/2014/main" id="{5A44FD3A-0F82-C17A-42D7-0E66AF91E6A9}"/>
+                <a16:creationId xmlns:a16="http://schemas.microsoft.com/office/drawing/2014/main" id="{C5C1ABFB-30A8-9747-8643-B402AB99EC65}"/>
               </a:ext>
             </a:extLst>
           </p:cNvPr>
@@ -5043,7 +5205,7 @@
           <a:p>
             <a:r>
               <a:rPr lang="uk-UA" dirty="0"/>
-              <a:t>Головна сторінка</a:t>
+              <a:t>Сторінка реєстрації</a:t>
             </a:r>
           </a:p>
         </p:txBody>
@@ -5053,7 +5215,7 @@
           <p:cNvPr id="6" name="Місце для вмісту 5">
             <a:extLst>
               <a:ext uri="{FF2B5EF4-FFF2-40B4-BE49-F238E27FC236}">
-                <a16:creationId xmlns:a16="http://schemas.microsoft.com/office/drawing/2014/main" id="{B9F2F42D-94E6-08B3-D9A8-636D7DB230CA}"/>
+                <a16:creationId xmlns:a16="http://schemas.microsoft.com/office/drawing/2014/main" id="{00541D27-563C-2FD2-5AD8-6C2050477E7B}"/>
               </a:ext>
             </a:extLst>
           </p:cNvPr>
@@ -5072,8 +5234,8 @@
         </p:blipFill>
         <p:spPr>
           <a:xfrm>
-            <a:off x="5091113" y="668114"/>
-            <a:ext cx="5446712" cy="2517578"/>
+            <a:off x="5119688" y="1971676"/>
+            <a:ext cx="5883290" cy="2711828"/>
           </a:xfrm>
         </p:spPr>
       </p:pic>
@@ -5082,7 +5244,7 @@
           <p:cNvPr id="4" name="Місце для тексту 3">
             <a:extLst>
               <a:ext uri="{FF2B5EF4-FFF2-40B4-BE49-F238E27FC236}">
-                <a16:creationId xmlns:a16="http://schemas.microsoft.com/office/drawing/2014/main" id="{2FF929B8-B005-8A1E-A9AF-D35325676CCA}"/>
+                <a16:creationId xmlns:a16="http://schemas.microsoft.com/office/drawing/2014/main" id="{41EDE77A-1171-5139-C970-E3962C0545DA}"/>
               </a:ext>
             </a:extLst>
           </p:cNvPr>
@@ -5095,21 +5257,28 @@
         </p:nvSpPr>
         <p:spPr/>
         <p:txBody>
-          <a:bodyPr>
-            <a:normAutofit fontScale="85000" lnSpcReduction="20000"/>
-          </a:bodyPr>
+          <a:bodyPr/>
           <a:lstStyle/>
           <a:p>
             <a:r>
               <a:rPr lang="uk-UA" dirty="0"/>
-              <a:t>Тут можна переглянути продукти магазину та додати їх до кошика, дані облікового запису. Також є можливість вийти із системи та перейти до кошика. Ще тут присутній фільтр товарів за категорією.</a:t>
-            </a:r>
-            <a:endParaRPr lang="en-US" dirty="0"/>
-          </a:p>
-          <a:p>
+              <a:t>Тут користувач створює свій обліковий запис. Дані зберігаються у </a:t>
+            </a:r>
+            <a:r>
+              <a:rPr lang="en-US" dirty="0"/>
+              <a:t>Firebase</a:t>
+            </a:r>
             <a:r>
               <a:rPr lang="uk-UA" dirty="0"/>
-              <a:t>Дані про продукти зберігаються в </a:t>
+              <a:t> з використанням технологій </a:t>
+            </a:r>
+            <a:r>
+              <a:rPr lang="en-US" dirty="0"/>
+              <a:t>Firebase Authentication </a:t>
+            </a:r>
+            <a:r>
+              <a:rPr lang="uk-UA" dirty="0"/>
+              <a:t>та </a:t>
             </a:r>
             <a:r>
               <a:rPr lang="en-US" dirty="0"/>
@@ -5119,74 +5288,21 @@
               <a:rPr lang="en-US" dirty="0" err="1"/>
               <a:t>Firestore</a:t>
             </a:r>
-            <a:endParaRPr lang="uk-UA" dirty="0"/>
-          </a:p>
-        </p:txBody>
-      </p:sp>
-      <p:pic>
-        <p:nvPicPr>
-          <p:cNvPr id="8" name="Рисунок 7">
-            <a:extLst>
-              <a:ext uri="{FF2B5EF4-FFF2-40B4-BE49-F238E27FC236}">
-                <a16:creationId xmlns:a16="http://schemas.microsoft.com/office/drawing/2014/main" id="{534223C6-DD03-4E05-00D6-1BD1BD2EBF72}"/>
-              </a:ext>
-            </a:extLst>
-          </p:cNvPr>
-          <p:cNvPicPr>
-            <a:picLocks noChangeAspect="1"/>
-          </p:cNvPicPr>
-          <p:nvPr/>
-        </p:nvPicPr>
-        <p:blipFill>
-          <a:blip r:embed="rId3"/>
-          <a:stretch>
-            <a:fillRect/>
-          </a:stretch>
-        </p:blipFill>
-        <p:spPr>
-          <a:xfrm>
-            <a:off x="5091113" y="3257550"/>
-            <a:ext cx="2953612" cy="3238500"/>
-          </a:xfrm>
-          <a:prstGeom prst="rect">
-            <a:avLst/>
-          </a:prstGeom>
-        </p:spPr>
-      </p:pic>
-      <p:pic>
-        <p:nvPicPr>
-          <p:cNvPr id="10" name="Рисунок 9">
-            <a:extLst>
-              <a:ext uri="{FF2B5EF4-FFF2-40B4-BE49-F238E27FC236}">
-                <a16:creationId xmlns:a16="http://schemas.microsoft.com/office/drawing/2014/main" id="{EB8E37AE-D51D-8F3B-3ACE-58BA5B26D019}"/>
-              </a:ext>
-            </a:extLst>
-          </p:cNvPr>
-          <p:cNvPicPr>
-            <a:picLocks noChangeAspect="1"/>
-          </p:cNvPicPr>
-          <p:nvPr/>
-        </p:nvPicPr>
-        <p:blipFill>
-          <a:blip r:embed="rId4"/>
-          <a:stretch>
-            <a:fillRect/>
-          </a:stretch>
-        </p:blipFill>
-        <p:spPr>
-          <a:xfrm>
-            <a:off x="8172028" y="3429000"/>
-            <a:ext cx="2943944" cy="1938534"/>
-          </a:xfrm>
-          <a:prstGeom prst="rect">
-            <a:avLst/>
-          </a:prstGeom>
-        </p:spPr>
-      </p:pic>
+            <a:r>
+              <a:rPr lang="en-US" dirty="0"/>
+              <a:t>.</a:t>
+            </a:r>
+            <a:r>
+              <a:rPr lang="uk-UA" dirty="0"/>
+              <a:t> </a:t>
+            </a:r>
+          </a:p>
+        </p:txBody>
+      </p:sp>
     </p:spTree>
     <p:extLst>
       <p:ext uri="{BB962C8B-B14F-4D97-AF65-F5344CB8AC3E}">
-        <p14:creationId xmlns:p14="http://schemas.microsoft.com/office/powerpoint/2010/main" val="1769046634"/>
+        <p14:creationId xmlns:p14="http://schemas.microsoft.com/office/powerpoint/2010/main" val="2906563175"/>
       </p:ext>
     </p:extLst>
   </p:cSld>
@@ -5218,7 +5334,7 @@
           <p:cNvPr id="2" name="Заголовок 1">
             <a:extLst>
               <a:ext uri="{FF2B5EF4-FFF2-40B4-BE49-F238E27FC236}">
-                <a16:creationId xmlns:a16="http://schemas.microsoft.com/office/drawing/2014/main" id="{8A1F405F-5090-C15E-004A-5C09AD0852BB}"/>
+                <a16:creationId xmlns:a16="http://schemas.microsoft.com/office/drawing/2014/main" id="{5A44FD3A-0F82-C17A-42D7-0E66AF91E6A9}"/>
               </a:ext>
             </a:extLst>
           </p:cNvPr>
@@ -5236,7 +5352,7 @@
           <a:p>
             <a:r>
               <a:rPr lang="uk-UA" dirty="0"/>
-              <a:t>База даних</a:t>
+              <a:t>Головна сторінка</a:t>
             </a:r>
           </a:p>
         </p:txBody>
@@ -5246,7 +5362,7 @@
           <p:cNvPr id="6" name="Місце для вмісту 5">
             <a:extLst>
               <a:ext uri="{FF2B5EF4-FFF2-40B4-BE49-F238E27FC236}">
-                <a16:creationId xmlns:a16="http://schemas.microsoft.com/office/drawing/2014/main" id="{E3D1E63A-78BD-CA7F-6002-AACE86D90FA0}"/>
+                <a16:creationId xmlns:a16="http://schemas.microsoft.com/office/drawing/2014/main" id="{B9F2F42D-94E6-08B3-D9A8-636D7DB230CA}"/>
               </a:ext>
             </a:extLst>
           </p:cNvPr>
@@ -5265,8 +5381,8 @@
         </p:blipFill>
         <p:spPr>
           <a:xfrm>
-            <a:off x="5062538" y="809699"/>
-            <a:ext cx="5446712" cy="1998515"/>
+            <a:off x="5091113" y="668114"/>
+            <a:ext cx="5446712" cy="2517578"/>
           </a:xfrm>
         </p:spPr>
       </p:pic>
@@ -5275,7 +5391,7 @@
           <p:cNvPr id="4" name="Місце для тексту 3">
             <a:extLst>
               <a:ext uri="{FF2B5EF4-FFF2-40B4-BE49-F238E27FC236}">
-                <a16:creationId xmlns:a16="http://schemas.microsoft.com/office/drawing/2014/main" id="{1504488B-4F3E-AD0D-98FF-3AEF0B1D7CFD}"/>
+                <a16:creationId xmlns:a16="http://schemas.microsoft.com/office/drawing/2014/main" id="{2FF929B8-B005-8A1E-A9AF-D35325676CCA}"/>
               </a:ext>
             </a:extLst>
           </p:cNvPr>
@@ -5288,13 +5404,31 @@
         </p:nvSpPr>
         <p:spPr/>
         <p:txBody>
-          <a:bodyPr/>
+          <a:bodyPr>
+            <a:normAutofit fontScale="85000" lnSpcReduction="20000"/>
+          </a:bodyPr>
           <a:lstStyle/>
           <a:p>
             <a:r>
               <a:rPr lang="uk-UA" dirty="0"/>
-              <a:t>Тут можна переглянути приклад збереження даних про товари та користувачів.</a:t>
-            </a:r>
+              <a:t>Тут можна переглянути продукти магазину та додати їх до кошика, дані облікового запису. Також є можливість вийти із системи та перейти до кошика. Ще тут присутній фільтр товарів за категорією.</a:t>
+            </a:r>
+            <a:endParaRPr lang="en-US" dirty="0"/>
+          </a:p>
+          <a:p>
+            <a:r>
+              <a:rPr lang="uk-UA" dirty="0"/>
+              <a:t>Дані про продукти зберігаються в </a:t>
+            </a:r>
+            <a:r>
+              <a:rPr lang="en-US" dirty="0"/>
+              <a:t>Cloud </a:t>
+            </a:r>
+            <a:r>
+              <a:rPr lang="en-US" dirty="0" err="1"/>
+              <a:t>Firestore</a:t>
+            </a:r>
+            <a:endParaRPr lang="uk-UA" dirty="0"/>
           </a:p>
         </p:txBody>
       </p:sp>
@@ -5303,7 +5437,7 @@
           <p:cNvPr id="8" name="Рисунок 7">
             <a:extLst>
               <a:ext uri="{FF2B5EF4-FFF2-40B4-BE49-F238E27FC236}">
-                <a16:creationId xmlns:a16="http://schemas.microsoft.com/office/drawing/2014/main" id="{E8DD692E-25EF-2662-B268-AFB71F08EDDB}"/>
+                <a16:creationId xmlns:a16="http://schemas.microsoft.com/office/drawing/2014/main" id="{534223C6-DD03-4E05-00D6-1BD1BD2EBF72}"/>
               </a:ext>
             </a:extLst>
           </p:cNvPr>
@@ -5320,8 +5454,38 @@
         </p:blipFill>
         <p:spPr>
           <a:xfrm>
-            <a:off x="4833542" y="3812194"/>
-            <a:ext cx="5904704" cy="1673548"/>
+            <a:off x="5091113" y="3257550"/>
+            <a:ext cx="2953612" cy="3238500"/>
+          </a:xfrm>
+          <a:prstGeom prst="rect">
+            <a:avLst/>
+          </a:prstGeom>
+        </p:spPr>
+      </p:pic>
+      <p:pic>
+        <p:nvPicPr>
+          <p:cNvPr id="10" name="Рисунок 9">
+            <a:extLst>
+              <a:ext uri="{FF2B5EF4-FFF2-40B4-BE49-F238E27FC236}">
+                <a16:creationId xmlns:a16="http://schemas.microsoft.com/office/drawing/2014/main" id="{EB8E37AE-D51D-8F3B-3ACE-58BA5B26D019}"/>
+              </a:ext>
+            </a:extLst>
+          </p:cNvPr>
+          <p:cNvPicPr>
+            <a:picLocks noChangeAspect="1"/>
+          </p:cNvPicPr>
+          <p:nvPr/>
+        </p:nvPicPr>
+        <p:blipFill>
+          <a:blip r:embed="rId4"/>
+          <a:stretch>
+            <a:fillRect/>
+          </a:stretch>
+        </p:blipFill>
+        <p:spPr>
+          <a:xfrm>
+            <a:off x="8172028" y="3429000"/>
+            <a:ext cx="2943944" cy="1938534"/>
           </a:xfrm>
           <a:prstGeom prst="rect">
             <a:avLst/>
@@ -5331,7 +5495,7 @@
     </p:spTree>
     <p:extLst>
       <p:ext uri="{BB962C8B-B14F-4D97-AF65-F5344CB8AC3E}">
-        <p14:creationId xmlns:p14="http://schemas.microsoft.com/office/powerpoint/2010/main" val="1024932408"/>
+        <p14:creationId xmlns:p14="http://schemas.microsoft.com/office/powerpoint/2010/main" val="1769046634"/>
       </p:ext>
     </p:extLst>
   </p:cSld>
@@ -5478,7 +5642,7 @@
           <p:cNvPr id="2" name="Заголовок 1">
             <a:extLst>
               <a:ext uri="{FF2B5EF4-FFF2-40B4-BE49-F238E27FC236}">
-                <a16:creationId xmlns:a16="http://schemas.microsoft.com/office/drawing/2014/main" id="{F95F038A-8C1A-056F-B6C4-1C3215E054E7}"/>
+                <a16:creationId xmlns:a16="http://schemas.microsoft.com/office/drawing/2014/main" id="{8A1F405F-5090-C15E-004A-5C09AD0852BB}"/>
               </a:ext>
             </a:extLst>
           </p:cNvPr>
@@ -5496,53 +5660,17 @@
           <a:p>
             <a:r>
               <a:rPr lang="uk-UA" dirty="0"/>
-              <a:t>Сторінка оформлення замовлення</a:t>
-            </a:r>
-          </a:p>
-        </p:txBody>
-      </p:sp>
-      <p:sp>
-        <p:nvSpPr>
-          <p:cNvPr id="4" name="Місце для тексту 3">
+              <a:t>База даних</a:t>
+            </a:r>
+          </a:p>
+        </p:txBody>
+      </p:sp>
+      <p:pic>
+        <p:nvPicPr>
+          <p:cNvPr id="6" name="Місце для вмісту 5">
             <a:extLst>
               <a:ext uri="{FF2B5EF4-FFF2-40B4-BE49-F238E27FC236}">
-                <a16:creationId xmlns:a16="http://schemas.microsoft.com/office/drawing/2014/main" id="{66EA8E42-E104-1E78-E905-318D5F328030}"/>
-              </a:ext>
-            </a:extLst>
-          </p:cNvPr>
-          <p:cNvSpPr>
-            <a:spLocks noGrp="1"/>
-          </p:cNvSpPr>
-          <p:nvPr>
-            <p:ph type="body" sz="half" idx="2"/>
-          </p:nvPr>
-        </p:nvSpPr>
-        <p:spPr/>
-        <p:txBody>
-          <a:bodyPr/>
-          <a:lstStyle/>
-          <a:p>
-            <a:r>
-              <a:rPr lang="uk-UA" dirty="0"/>
-              <a:t>Тут можна вибрати спосіб оплати та доставки товару. Оплата можлива готівкою або карткою. Доставка можлива до дверей або </a:t>
-            </a:r>
-            <a:r>
-              <a:rPr lang="uk-UA" dirty="0" err="1"/>
-              <a:t>самовивіз</a:t>
-            </a:r>
-            <a:r>
-              <a:rPr lang="uk-UA" dirty="0"/>
-              <a:t> з відділення доставки.</a:t>
-            </a:r>
-          </a:p>
-        </p:txBody>
-      </p:sp>
-      <p:pic>
-        <p:nvPicPr>
-          <p:cNvPr id="12" name="Місце для вмісту 11">
-            <a:extLst>
-              <a:ext uri="{FF2B5EF4-FFF2-40B4-BE49-F238E27FC236}">
-                <a16:creationId xmlns:a16="http://schemas.microsoft.com/office/drawing/2014/main" id="{35F2FE58-ECFC-F5AF-1AE5-8520766A2232}"/>
+                <a16:creationId xmlns:a16="http://schemas.microsoft.com/office/drawing/2014/main" id="{E3D1E63A-78BD-CA7F-6002-AACE86D90FA0}"/>
               </a:ext>
             </a:extLst>
           </p:cNvPr>
@@ -5561,17 +5689,45 @@
         </p:blipFill>
         <p:spPr>
           <a:xfrm>
-            <a:off x="5108318" y="669425"/>
-            <a:ext cx="5446712" cy="2516267"/>
+            <a:off x="5062538" y="809699"/>
+            <a:ext cx="5446712" cy="1998515"/>
           </a:xfrm>
         </p:spPr>
       </p:pic>
+      <p:sp>
+        <p:nvSpPr>
+          <p:cNvPr id="4" name="Місце для тексту 3">
+            <a:extLst>
+              <a:ext uri="{FF2B5EF4-FFF2-40B4-BE49-F238E27FC236}">
+                <a16:creationId xmlns:a16="http://schemas.microsoft.com/office/drawing/2014/main" id="{1504488B-4F3E-AD0D-98FF-3AEF0B1D7CFD}"/>
+              </a:ext>
+            </a:extLst>
+          </p:cNvPr>
+          <p:cNvSpPr>
+            <a:spLocks noGrp="1"/>
+          </p:cNvSpPr>
+          <p:nvPr>
+            <p:ph type="body" sz="half" idx="2"/>
+          </p:nvPr>
+        </p:nvSpPr>
+        <p:spPr/>
+        <p:txBody>
+          <a:bodyPr/>
+          <a:lstStyle/>
+          <a:p>
+            <a:r>
+              <a:rPr lang="uk-UA" dirty="0"/>
+              <a:t>Тут можна переглянути приклад збереження даних про товари та користувачів.</a:t>
+            </a:r>
+          </a:p>
+        </p:txBody>
+      </p:sp>
       <p:pic>
         <p:nvPicPr>
-          <p:cNvPr id="14" name="Рисунок 13">
+          <p:cNvPr id="8" name="Рисунок 7">
             <a:extLst>
               <a:ext uri="{FF2B5EF4-FFF2-40B4-BE49-F238E27FC236}">
-                <a16:creationId xmlns:a16="http://schemas.microsoft.com/office/drawing/2014/main" id="{4F66181F-AB08-301F-10B8-28DE7F4213FC}"/>
+                <a16:creationId xmlns:a16="http://schemas.microsoft.com/office/drawing/2014/main" id="{E8DD692E-25EF-2662-B268-AFB71F08EDDB}"/>
               </a:ext>
             </a:extLst>
           </p:cNvPr>
@@ -5588,8 +5744,8 @@
         </p:blipFill>
         <p:spPr>
           <a:xfrm>
-            <a:off x="4636036" y="3961507"/>
-            <a:ext cx="6629399" cy="1865490"/>
+            <a:off x="4833542" y="3812194"/>
+            <a:ext cx="5904704" cy="1673548"/>
           </a:xfrm>
           <a:prstGeom prst="rect">
             <a:avLst/>
@@ -5599,7 +5755,7 @@
     </p:spTree>
     <p:extLst>
       <p:ext uri="{BB962C8B-B14F-4D97-AF65-F5344CB8AC3E}">
-        <p14:creationId xmlns:p14="http://schemas.microsoft.com/office/powerpoint/2010/main" val="3135643495"/>
+        <p14:creationId xmlns:p14="http://schemas.microsoft.com/office/powerpoint/2010/main" val="1024932408"/>
       </p:ext>
     </p:extLst>
   </p:cSld>

</xml_diff>

<commit_message>
added comments to code, some changes to docs and presentation
</commit_message>
<xml_diff>
--- a/Додаток для замовлення продуктів в магазині.pptx
+++ b/Додаток для замовлення продуктів в магазині.pptx
@@ -338,7 +338,7 @@
           <a:p>
             <a:fld id="{9AB3A824-1A51-4B26-AD58-A6D8E14F6C04}" type="datetimeFigureOut">
               <a:rPr lang="en-US" dirty="0"/>
-              <a:t>4/25/2024</a:t>
+              <a:t>5/7/2024</a:t>
             </a:fld>
             <a:endParaRPr lang="en-US" dirty="0"/>
           </a:p>
@@ -672,7 +672,7 @@
           <a:p>
             <a:fld id="{D857E33E-8B18-4087-B112-809917729534}" type="datetimeFigureOut">
               <a:rPr lang="en-US" dirty="0"/>
-              <a:t>4/25/2024</a:t>
+              <a:t>5/7/2024</a:t>
             </a:fld>
             <a:endParaRPr lang="en-US" dirty="0"/>
           </a:p>
@@ -974,7 +974,7 @@
           <a:p>
             <a:fld id="{D3FFE419-2371-464F-8239-3959401C3561}" type="datetimeFigureOut">
               <a:rPr lang="en-US" dirty="0"/>
-              <a:t>4/25/2024</a:t>
+              <a:t>5/7/2024</a:t>
             </a:fld>
             <a:endParaRPr lang="en-US" dirty="0"/>
           </a:p>
@@ -1221,7 +1221,7 @@
           <a:p>
             <a:fld id="{97D162C4-EDD9-4389-A98B-B87ECEA2A816}" type="datetimeFigureOut">
               <a:rPr lang="en-US" dirty="0"/>
-              <a:t>4/25/2024</a:t>
+              <a:t>5/7/2024</a:t>
             </a:fld>
             <a:endParaRPr lang="en-US" dirty="0"/>
           </a:p>
@@ -1628,7 +1628,7 @@
           <a:p>
             <a:fld id="{3E5059C3-6A89-4494-99FF-5A4D6FFD50EB}" type="datetimeFigureOut">
               <a:rPr lang="en-US" dirty="0"/>
-              <a:t>4/25/2024</a:t>
+              <a:t>5/7/2024</a:t>
             </a:fld>
             <a:endParaRPr lang="en-US" dirty="0"/>
           </a:p>
@@ -1942,7 +1942,7 @@
           <a:p>
             <a:fld id="{CA954B2F-12DE-47F5-8894-472B206D2E1E}" type="datetimeFigureOut">
               <a:rPr lang="en-US" dirty="0"/>
-              <a:t>4/25/2024</a:t>
+              <a:t>5/7/2024</a:t>
             </a:fld>
             <a:endParaRPr lang="en-US" dirty="0"/>
           </a:p>
@@ -2486,7 +2486,7 @@
           <a:p>
             <a:fld id="{3F30E46F-7819-4ACF-B48B-48222C2ACC88}" type="datetimeFigureOut">
               <a:rPr lang="en-US" dirty="0"/>
-              <a:t>4/25/2024</a:t>
+              <a:t>5/7/2024</a:t>
             </a:fld>
             <a:endParaRPr lang="en-US" dirty="0"/>
           </a:p>
@@ -2681,7 +2681,7 @@
           <a:p>
             <a:fld id="{1FAF3416-4057-4DAA-829D-4CA07428D088}" type="datetimeFigureOut">
               <a:rPr lang="en-US" dirty="0"/>
-              <a:t>4/25/2024</a:t>
+              <a:t>5/7/2024</a:t>
             </a:fld>
             <a:endParaRPr lang="en-US" dirty="0"/>
           </a:p>
@@ -2894,7 +2894,7 @@
           <a:p>
             <a:fld id="{921D9284-D300-4297-87F7-E791DCC15DB1}" type="datetimeFigureOut">
               <a:rPr lang="en-US" dirty="0"/>
-              <a:t>4/25/2024</a:t>
+              <a:t>5/7/2024</a:t>
             </a:fld>
             <a:endParaRPr lang="en-US" dirty="0"/>
           </a:p>
@@ -3263,7 +3263,7 @@
           <a:p>
             <a:fld id="{37D525BB-DA17-4BA0-B3C8-3AC3ABC827E6}" type="datetimeFigureOut">
               <a:rPr lang="en-US" dirty="0"/>
-              <a:t>4/25/2024</a:t>
+              <a:t>5/7/2024</a:t>
             </a:fld>
             <a:endParaRPr lang="en-US" dirty="0"/>
           </a:p>
@@ -3666,7 +3666,7 @@
           <a:p>
             <a:fld id="{B16C4C9A-3960-41CF-A4E9-2A8FB932454B}" type="datetimeFigureOut">
               <a:rPr lang="en-US" dirty="0"/>
-              <a:t>4/25/2024</a:t>
+              <a:t>5/7/2024</a:t>
             </a:fld>
             <a:endParaRPr lang="en-US" dirty="0"/>
           </a:p>
@@ -3977,7 +3977,7 @@
           <a:p>
             <a:fld id="{3CBC1C18-307B-4F68-A007-B5B542270E8D}" type="datetimeFigureOut">
               <a:rPr lang="en-US" dirty="0"/>
-              <a:t>4/25/2024</a:t>
+              <a:t>5/7/2024</a:t>
             </a:fld>
             <a:endParaRPr lang="en-US" dirty="0"/>
           </a:p>
@@ -4923,10 +4923,10 @@
       </p:sp>
       <p:pic>
         <p:nvPicPr>
-          <p:cNvPr id="5" name="Місце для вмісту 4">
+          <p:cNvPr id="7" name="Місце для вмісту 6">
             <a:extLst>
               <a:ext uri="{FF2B5EF4-FFF2-40B4-BE49-F238E27FC236}">
-                <a16:creationId xmlns:a16="http://schemas.microsoft.com/office/drawing/2014/main" id="{873BE3DE-0AE8-542C-37FF-CA2C3BD8B52D}"/>
+                <a16:creationId xmlns:a16="http://schemas.microsoft.com/office/drawing/2014/main" id="{BD5E4BD5-BBA2-03CC-6A38-E9D25F190E82}"/>
               </a:ext>
             </a:extLst>
           </p:cNvPr>
@@ -4945,8 +4945,8 @@
         </p:blipFill>
         <p:spPr>
           <a:xfrm>
-            <a:off x="4039472" y="1885285"/>
-            <a:ext cx="4921648" cy="4440078"/>
+            <a:off x="3698240" y="1558617"/>
+            <a:ext cx="5881952" cy="4925908"/>
           </a:xfrm>
         </p:spPr>
       </p:pic>

</xml_diff>